<commit_message>
Add page for testing more complicated queries
</commit_message>
<xml_diff>
--- a/drafts/degrees-of-kevin-bloom.pptx
+++ b/drafts/degrees-of-kevin-bloom.pptx
@@ -3078,7 +3078,10 @@
             <a:p>
               <a:pPr algn="ctr"/>
               <a:r>
-                <a:rPr lang="en-US" sz="1200">
+                <a:rPr lang="en-US" sz="1200" dirty="0">
+                  <a:solidFill>
+                    <a:schemeClr val="bg1"/>
+                  </a:solidFill>
                   <a:latin typeface="Courier New" panose="02070309020205020404" pitchFamily="49" charset="0"/>
                   <a:cs typeface="Courier New" panose="02070309020205020404" pitchFamily="49" charset="0"/>
                 </a:rPr>
@@ -3189,6 +3192,9 @@
               <a:pPr algn="ctr"/>
               <a:r>
                 <a:rPr lang="en-US" sz="1200" dirty="0">
+                  <a:solidFill>
+                    <a:schemeClr val="bg1"/>
+                  </a:solidFill>
                   <a:latin typeface="Courier New" panose="02070309020205020404" pitchFamily="49" charset="0"/>
                   <a:cs typeface="Courier New" panose="02070309020205020404" pitchFamily="49" charset="0"/>
                 </a:rPr>
@@ -3299,6 +3305,9 @@
               <a:pPr algn="ctr"/>
               <a:r>
                 <a:rPr lang="en-US" sz="1200" dirty="0">
+                  <a:solidFill>
+                    <a:schemeClr val="bg1"/>
+                  </a:solidFill>
                   <a:latin typeface="Courier New" panose="02070309020205020404" pitchFamily="49" charset="0"/>
                   <a:cs typeface="Courier New" panose="02070309020205020404" pitchFamily="49" charset="0"/>
                 </a:rPr>
@@ -3409,6 +3418,9 @@
               <a:pPr algn="ctr"/>
               <a:r>
                 <a:rPr lang="en-US" sz="1200" dirty="0">
+                  <a:solidFill>
+                    <a:schemeClr val="bg1"/>
+                  </a:solidFill>
                   <a:latin typeface="Courier New" panose="02070309020205020404" pitchFamily="49" charset="0"/>
                   <a:cs typeface="Courier New" panose="02070309020205020404" pitchFamily="49" charset="0"/>
                 </a:rPr>
@@ -3519,6 +3531,9 @@
               <a:pPr algn="ctr"/>
               <a:r>
                 <a:rPr lang="en-US" sz="1200" dirty="0">
+                  <a:solidFill>
+                    <a:schemeClr val="bg1"/>
+                  </a:solidFill>
                   <a:latin typeface="Courier New" panose="02070309020205020404" pitchFamily="49" charset="0"/>
                   <a:cs typeface="Courier New" panose="02070309020205020404" pitchFamily="49" charset="0"/>
                 </a:rPr>
@@ -3629,6 +3644,9 @@
               <a:pPr algn="ctr"/>
               <a:r>
                 <a:rPr lang="en-US" sz="1200" dirty="0">
+                  <a:solidFill>
+                    <a:schemeClr val="bg1"/>
+                  </a:solidFill>
                   <a:latin typeface="Courier New" panose="02070309020205020404" pitchFamily="49" charset="0"/>
                   <a:cs typeface="Courier New" panose="02070309020205020404" pitchFamily="49" charset="0"/>
                 </a:rPr>
@@ -3739,6 +3757,9 @@
               <a:pPr algn="ctr"/>
               <a:r>
                 <a:rPr lang="en-US" sz="1200" dirty="0">
+                  <a:solidFill>
+                    <a:schemeClr val="bg1"/>
+                  </a:solidFill>
                   <a:latin typeface="Courier New" panose="02070309020205020404" pitchFamily="49" charset="0"/>
                   <a:cs typeface="Courier New" panose="02070309020205020404" pitchFamily="49" charset="0"/>
                 </a:rPr>
@@ -3779,6 +3800,9 @@
             <a:pPr algn="ctr"/>
             <a:r>
               <a:rPr lang="en-US" sz="1200" dirty="0">
+                <a:solidFill>
+                  <a:schemeClr val="bg1"/>
+                </a:solidFill>
                 <a:latin typeface="Courier New" panose="02070309020205020404" pitchFamily="49" charset="0"/>
                 <a:cs typeface="Courier New" panose="02070309020205020404" pitchFamily="49" charset="0"/>
               </a:rPr>
@@ -3818,6 +3842,9 @@
             <a:pPr algn="ctr"/>
             <a:r>
               <a:rPr lang="en-US" sz="1200" dirty="0">
+                <a:solidFill>
+                  <a:schemeClr val="bg1"/>
+                </a:solidFill>
                 <a:latin typeface="Courier New" panose="02070309020205020404" pitchFamily="49" charset="0"/>
                 <a:cs typeface="Courier New" panose="02070309020205020404" pitchFamily="49" charset="0"/>
               </a:rPr>
@@ -3857,6 +3884,9 @@
             <a:pPr algn="ctr"/>
             <a:r>
               <a:rPr lang="en-US" sz="1200" dirty="0">
+                <a:solidFill>
+                  <a:schemeClr val="bg1"/>
+                </a:solidFill>
                 <a:latin typeface="Courier New" panose="02070309020205020404" pitchFamily="49" charset="0"/>
                 <a:cs typeface="Courier New" panose="02070309020205020404" pitchFamily="49" charset="0"/>
               </a:rPr>
@@ -3896,6 +3926,9 @@
             <a:pPr algn="ctr"/>
             <a:r>
               <a:rPr lang="en-US" sz="1200" dirty="0">
+                <a:solidFill>
+                  <a:schemeClr val="bg1"/>
+                </a:solidFill>
                 <a:latin typeface="Courier New" panose="02070309020205020404" pitchFamily="49" charset="0"/>
                 <a:cs typeface="Courier New" panose="02070309020205020404" pitchFamily="49" charset="0"/>
               </a:rPr>
@@ -3935,6 +3968,9 @@
             <a:pPr algn="ctr"/>
             <a:r>
               <a:rPr lang="en-US" sz="1200" dirty="0">
+                <a:solidFill>
+                  <a:schemeClr val="bg1"/>
+                </a:solidFill>
                 <a:latin typeface="Courier New" panose="02070309020205020404" pitchFamily="49" charset="0"/>
                 <a:cs typeface="Courier New" panose="02070309020205020404" pitchFamily="49" charset="0"/>
               </a:rPr>
@@ -3974,6 +4010,9 @@
             <a:pPr algn="ctr"/>
             <a:r>
               <a:rPr lang="en-US" sz="1200" dirty="0">
+                <a:solidFill>
+                  <a:schemeClr val="bg1"/>
+                </a:solidFill>
                 <a:latin typeface="Courier New" panose="02070309020205020404" pitchFamily="49" charset="0"/>
                 <a:cs typeface="Courier New" panose="02070309020205020404" pitchFamily="49" charset="0"/>
               </a:rPr>
@@ -5203,6 +5242,9 @@
               <a:pPr algn="ctr"/>
               <a:r>
                 <a:rPr lang="en-US" sz="1200" dirty="0">
+                  <a:solidFill>
+                    <a:schemeClr val="bg1"/>
+                  </a:solidFill>
                   <a:latin typeface="Courier New" panose="02070309020205020404" pitchFamily="49" charset="0"/>
                   <a:cs typeface="Courier New" panose="02070309020205020404" pitchFamily="49" charset="0"/>
                 </a:rPr>

</xml_diff>

<commit_message>
Docs on debugging and `\include` and `\set`
</commit_message>
<xml_diff>
--- a/drafts/degrees-of-kevin-bloom.pptx
+++ b/drafts/degrees-of-kevin-bloom.pptx
@@ -2971,6 +2971,58 @@
           <a:chExt cx="0" cy="0"/>
         </a:xfrm>
       </p:grpSpPr>
+      <p:sp>
+        <p:nvSpPr>
+          <p:cNvPr id="59" name="Rectangle 58">
+            <a:extLst>
+              <a:ext uri="{FF2B5EF4-FFF2-40B4-BE49-F238E27FC236}">
+                <a16:creationId xmlns:a16="http://schemas.microsoft.com/office/drawing/2014/main" id="{F21E1258-E67B-789C-8C2E-25E7533AA78E}"/>
+              </a:ext>
+            </a:extLst>
+          </p:cNvPr>
+          <p:cNvSpPr/>
+          <p:nvPr/>
+        </p:nvSpPr>
+        <p:spPr>
+          <a:xfrm>
+            <a:off x="10596282" y="8659906"/>
+            <a:ext cx="7745506" cy="13070541"/>
+          </a:xfrm>
+          <a:prstGeom prst="rect">
+            <a:avLst/>
+          </a:prstGeom>
+          <a:solidFill>
+            <a:srgbClr val="5E42A6"/>
+          </a:solidFill>
+          <a:ln>
+            <a:noFill/>
+          </a:ln>
+        </p:spPr>
+        <p:style>
+          <a:lnRef idx="2">
+            <a:schemeClr val="accent1">
+              <a:shade val="50000"/>
+            </a:schemeClr>
+          </a:lnRef>
+          <a:fillRef idx="1">
+            <a:schemeClr val="accent1"/>
+          </a:fillRef>
+          <a:effectRef idx="0">
+            <a:schemeClr val="accent1"/>
+          </a:effectRef>
+          <a:fontRef idx="minor">
+            <a:schemeClr val="lt1"/>
+          </a:fontRef>
+        </p:style>
+        <p:txBody>
+          <a:bodyPr rtlCol="0" anchor="ctr"/>
+          <a:lstStyle/>
+          <a:p>
+            <a:pPr algn="ctr"/>
+            <a:endParaRPr lang="en-US"/>
+          </a:p>
+        </p:txBody>
+      </p:sp>
       <p:grpSp>
         <p:nvGrpSpPr>
           <p:cNvPr id="5" name="Group 4">

</xml_diff>